<commit_message>
added .net and small refactor
</commit_message>
<xml_diff>
--- a/test.pptx
+++ b/test.pptx
@@ -5,11 +5,12 @@
     <p:sldMasterId id="2147483648" r:id="rId1"/>
   </p:sldMasterIdLst>
   <p:notesMasterIdLst>
-    <p:notesMasterId r:id="rId4"/>
+    <p:notesMasterId r:id="rId5"/>
   </p:notesMasterIdLst>
   <p:sldIdLst>
     <p:sldId id="256" r:id="rId2"/>
-    <p:sldId id="257" r:id="rId3"/>
+    <p:sldId id="258" r:id="rId3"/>
+    <p:sldId id="259" r:id="rId4"/>
   </p:sldIdLst>
   <p:sldSz cx="12192000" cy="6858000"/>
   <p:notesSz cx="6858000" cy="9144000"/>
@@ -198,7 +199,7 @@
           <a:p>
             <a:fld id="{2E1F56A2-3178-4782-B2EE-2EC55770787F}" type="datetimeFigureOut">
               <a:rPr lang="en-AU" smtClean="0"/>
-              <a:t>27/03/2024</a:t>
+              <a:t>28/03/2024</a:t>
             </a:fld>
             <a:endParaRPr lang="en-AU"/>
           </a:p>
@@ -511,43 +512,20 @@
           <a:lstStyle/>
           <a:p>
             <a:r>
-              <a:rPr lang="en-AU" b="1" dirty="0"/>
-              <a:t>This is the first note</a:t>
-            </a:r>
-          </a:p>
-          <a:p>
-            <a:r>
-              <a:rPr lang="en-AU" b="1"/>
-              <a:t>{pause 5}</a:t>
-            </a:r>
-            <a:endParaRPr lang="en-AU" b="1" dirty="0"/>
-          </a:p>
-          <a:p>
-            <a:r>
-              <a:rPr lang="en-AU" b="1" dirty="0"/>
-              <a:t>Is</a:t>
-            </a:r>
-          </a:p>
-          <a:p>
-            <a:r>
-              <a:rPr lang="en-AU" b="1" dirty="0"/>
-              <a:t>Page </a:t>
-            </a:r>
-          </a:p>
-          <a:p>
-            <a:r>
-              <a:rPr lang="en-AU" b="1" dirty="0"/>
-              <a:t>1</a:t>
-            </a:r>
-          </a:p>
-          <a:p>
-            <a:pPr marL="171450" indent="-171450">
-              <a:buFont typeface="Arial" panose="020B0604020202020204" pitchFamily="34" charset="0"/>
-              <a:buChar char="•"/>
-            </a:pPr>
-            <a:r>
-              <a:rPr lang="en-AU" b="1" dirty="0"/>
-              <a:t>What?</a:t>
+              <a:rPr lang="en-AU" b="0" dirty="0"/>
+              <a:t>This is the first slide, it has this note</a:t>
+            </a:r>
+          </a:p>
+          <a:p>
+            <a:r>
+              <a:rPr lang="en-AU" b="0" dirty="0"/>
+              <a:t>{pause 2}</a:t>
+            </a:r>
+          </a:p>
+          <a:p>
+            <a:r>
+              <a:rPr lang="en-AU" b="0" dirty="0"/>
+              <a:t>This is still the first slide and has this note after a 2 second pause.</a:t>
             </a:r>
           </a:p>
           <a:p>
@@ -636,26 +614,20 @@
           <a:lstStyle/>
           <a:p>
             <a:r>
-              <a:rPr lang="en-AU" dirty="0"/>
-              <a:t>This</a:t>
-            </a:r>
-          </a:p>
-          <a:p>
-            <a:r>
-              <a:rPr lang="en-AU" dirty="0"/>
-              <a:t>Is</a:t>
-            </a:r>
-          </a:p>
-          <a:p>
-            <a:r>
-              <a:rPr lang="en-AU" dirty="0"/>
-              <a:t>Page </a:t>
-            </a:r>
-          </a:p>
-          <a:p>
-            <a:r>
-              <a:rPr lang="en-AU" dirty="0"/>
-              <a:t>2</a:t>
+              <a:rPr lang="en-AU" b="0" dirty="0"/>
+              <a:t>This is the second slide, it has this note</a:t>
+            </a:r>
+          </a:p>
+          <a:p>
+            <a:r>
+              <a:rPr lang="en-AU" b="0" dirty="0"/>
+              <a:t>{pause 3}</a:t>
+            </a:r>
+          </a:p>
+          <a:p>
+            <a:r>
+              <a:rPr lang="en-AU" b="0" dirty="0"/>
+              <a:t>This is still the second slide and has this note after a 3 second pause.</a:t>
             </a:r>
           </a:p>
         </p:txBody>
@@ -686,7 +658,109 @@
     </p:spTree>
     <p:extLst>
       <p:ext uri="{BB962C8B-B14F-4D97-AF65-F5344CB8AC3E}">
-        <p14:creationId xmlns:p14="http://schemas.microsoft.com/office/powerpoint/2010/main" val="3254744103"/>
+        <p14:creationId xmlns:p14="http://schemas.microsoft.com/office/powerpoint/2010/main" val="3059195677"/>
+      </p:ext>
+    </p:extLst>
+  </p:cSld>
+  <p:clrMapOvr>
+    <a:masterClrMapping/>
+  </p:clrMapOvr>
+</p:notes>
+</file>
+
+<file path=ppt/notesSlides/notesSlide3.xml><?xml version="1.0" encoding="utf-8"?>
+<p:notes xmlns:a="http://schemas.openxmlformats.org/drawingml/2006/main" xmlns:r="http://schemas.openxmlformats.org/officeDocument/2006/relationships" xmlns:p="http://schemas.openxmlformats.org/presentationml/2006/main">
+  <p:cSld>
+    <p:spTree>
+      <p:nvGrpSpPr>
+        <p:cNvPr id="1" name=""/>
+        <p:cNvGrpSpPr/>
+        <p:nvPr/>
+      </p:nvGrpSpPr>
+      <p:grpSpPr>
+        <a:xfrm>
+          <a:off x="0" y="0"/>
+          <a:ext cx="0" cy="0"/>
+          <a:chOff x="0" y="0"/>
+          <a:chExt cx="0" cy="0"/>
+        </a:xfrm>
+      </p:grpSpPr>
+      <p:sp>
+        <p:nvSpPr>
+          <p:cNvPr id="2" name="Slide Image Placeholder 1"/>
+          <p:cNvSpPr>
+            <a:spLocks noGrp="1" noRot="1" noChangeAspect="1"/>
+          </p:cNvSpPr>
+          <p:nvPr>
+            <p:ph type="sldImg"/>
+          </p:nvPr>
+        </p:nvSpPr>
+        <p:spPr/>
+      </p:sp>
+      <p:sp>
+        <p:nvSpPr>
+          <p:cNvPr id="3" name="Notes Placeholder 2"/>
+          <p:cNvSpPr>
+            <a:spLocks noGrp="1"/>
+          </p:cNvSpPr>
+          <p:nvPr>
+            <p:ph type="body" idx="1"/>
+          </p:nvPr>
+        </p:nvSpPr>
+        <p:spPr/>
+        <p:txBody>
+          <a:bodyPr/>
+          <a:lstStyle/>
+          <a:p>
+            <a:r>
+              <a:rPr lang="en-AU" b="0" dirty="0"/>
+              <a:t>This is the third slide, it has this note</a:t>
+            </a:r>
+          </a:p>
+          <a:p>
+            <a:r>
+              <a:rPr lang="en-AU" b="0" dirty="0"/>
+              <a:t>{pause 10}</a:t>
+            </a:r>
+          </a:p>
+          <a:p>
+            <a:r>
+              <a:rPr lang="en-AU" b="0" dirty="0"/>
+              <a:t>This is still the third slide and has this note after a 10 second pause.</a:t>
+            </a:r>
+          </a:p>
+          <a:p>
+            <a:endParaRPr lang="en-AU" b="1" dirty="0"/>
+          </a:p>
+        </p:txBody>
+      </p:sp>
+      <p:sp>
+        <p:nvSpPr>
+          <p:cNvPr id="4" name="Slide Number Placeholder 3"/>
+          <p:cNvSpPr>
+            <a:spLocks noGrp="1"/>
+          </p:cNvSpPr>
+          <p:nvPr>
+            <p:ph type="sldNum" sz="quarter" idx="5"/>
+          </p:nvPr>
+        </p:nvSpPr>
+        <p:spPr/>
+        <p:txBody>
+          <a:bodyPr/>
+          <a:lstStyle/>
+          <a:p>
+            <a:fld id="{B4010C41-C78F-4783-B6C1-D57FD2F0A8BA}" type="slidenum">
+              <a:rPr lang="en-AU" smtClean="0"/>
+              <a:t>3</a:t>
+            </a:fld>
+            <a:endParaRPr lang="en-AU"/>
+          </a:p>
+        </p:txBody>
+      </p:sp>
+    </p:spTree>
+    <p:extLst>
+      <p:ext uri="{BB962C8B-B14F-4D97-AF65-F5344CB8AC3E}">
+        <p14:creationId xmlns:p14="http://schemas.microsoft.com/office/powerpoint/2010/main" val="3781830214"/>
       </p:ext>
     </p:extLst>
   </p:cSld>
@@ -845,7 +919,7 @@
           <a:p>
             <a:fld id="{66FE9D8B-FE65-4D70-813C-B0C2953C31EE}" type="datetimeFigureOut">
               <a:rPr lang="en-AU" smtClean="0"/>
-              <a:t>27/03/2024</a:t>
+              <a:t>28/03/2024</a:t>
             </a:fld>
             <a:endParaRPr lang="en-AU"/>
           </a:p>
@@ -1045,7 +1119,7 @@
           <a:p>
             <a:fld id="{66FE9D8B-FE65-4D70-813C-B0C2953C31EE}" type="datetimeFigureOut">
               <a:rPr lang="en-AU" smtClean="0"/>
-              <a:t>27/03/2024</a:t>
+              <a:t>28/03/2024</a:t>
             </a:fld>
             <a:endParaRPr lang="en-AU"/>
           </a:p>
@@ -1255,7 +1329,7 @@
           <a:p>
             <a:fld id="{66FE9D8B-FE65-4D70-813C-B0C2953C31EE}" type="datetimeFigureOut">
               <a:rPr lang="en-AU" smtClean="0"/>
-              <a:t>27/03/2024</a:t>
+              <a:t>28/03/2024</a:t>
             </a:fld>
             <a:endParaRPr lang="en-AU"/>
           </a:p>
@@ -1455,7 +1529,7 @@
           <a:p>
             <a:fld id="{66FE9D8B-FE65-4D70-813C-B0C2953C31EE}" type="datetimeFigureOut">
               <a:rPr lang="en-AU" smtClean="0"/>
-              <a:t>27/03/2024</a:t>
+              <a:t>28/03/2024</a:t>
             </a:fld>
             <a:endParaRPr lang="en-AU"/>
           </a:p>
@@ -1731,7 +1805,7 @@
           <a:p>
             <a:fld id="{66FE9D8B-FE65-4D70-813C-B0C2953C31EE}" type="datetimeFigureOut">
               <a:rPr lang="en-AU" smtClean="0"/>
-              <a:t>27/03/2024</a:t>
+              <a:t>28/03/2024</a:t>
             </a:fld>
             <a:endParaRPr lang="en-AU"/>
           </a:p>
@@ -1999,7 +2073,7 @@
           <a:p>
             <a:fld id="{66FE9D8B-FE65-4D70-813C-B0C2953C31EE}" type="datetimeFigureOut">
               <a:rPr lang="en-AU" smtClean="0"/>
-              <a:t>27/03/2024</a:t>
+              <a:t>28/03/2024</a:t>
             </a:fld>
             <a:endParaRPr lang="en-AU"/>
           </a:p>
@@ -2414,7 +2488,7 @@
           <a:p>
             <a:fld id="{66FE9D8B-FE65-4D70-813C-B0C2953C31EE}" type="datetimeFigureOut">
               <a:rPr lang="en-AU" smtClean="0"/>
-              <a:t>27/03/2024</a:t>
+              <a:t>28/03/2024</a:t>
             </a:fld>
             <a:endParaRPr lang="en-AU"/>
           </a:p>
@@ -2556,7 +2630,7 @@
           <a:p>
             <a:fld id="{66FE9D8B-FE65-4D70-813C-B0C2953C31EE}" type="datetimeFigureOut">
               <a:rPr lang="en-AU" smtClean="0"/>
-              <a:t>27/03/2024</a:t>
+              <a:t>28/03/2024</a:t>
             </a:fld>
             <a:endParaRPr lang="en-AU"/>
           </a:p>
@@ -2669,7 +2743,7 @@
           <a:p>
             <a:fld id="{66FE9D8B-FE65-4D70-813C-B0C2953C31EE}" type="datetimeFigureOut">
               <a:rPr lang="en-AU" smtClean="0"/>
-              <a:t>27/03/2024</a:t>
+              <a:t>28/03/2024</a:t>
             </a:fld>
             <a:endParaRPr lang="en-AU"/>
           </a:p>
@@ -2982,7 +3056,7 @@
           <a:p>
             <a:fld id="{66FE9D8B-FE65-4D70-813C-B0C2953C31EE}" type="datetimeFigureOut">
               <a:rPr lang="en-AU" smtClean="0"/>
-              <a:t>27/03/2024</a:t>
+              <a:t>28/03/2024</a:t>
             </a:fld>
             <a:endParaRPr lang="en-AU"/>
           </a:p>
@@ -3271,7 +3345,7 @@
           <a:p>
             <a:fld id="{66FE9D8B-FE65-4D70-813C-B0C2953C31EE}" type="datetimeFigureOut">
               <a:rPr lang="en-AU" smtClean="0"/>
-              <a:t>27/03/2024</a:t>
+              <a:t>28/03/2024</a:t>
             </a:fld>
             <a:endParaRPr lang="en-AU"/>
           </a:p>
@@ -3514,7 +3588,7 @@
           <a:p>
             <a:fld id="{66FE9D8B-FE65-4D70-813C-B0C2953C31EE}" type="datetimeFigureOut">
               <a:rPr lang="en-AU" smtClean="0"/>
-              <a:t>27/03/2024</a:t>
+              <a:t>28/03/2024</a:t>
             </a:fld>
             <a:endParaRPr lang="en-AU"/>
           </a:p>
@@ -3952,7 +4026,10 @@
           <a:bodyPr/>
           <a:lstStyle/>
           <a:p>
-            <a:endParaRPr lang="en-AU"/>
+            <a:r>
+              <a:rPr lang="en-AU" dirty="0"/>
+              <a:t>Slide 1</a:t>
+            </a:r>
           </a:p>
         </p:txBody>
       </p:sp>
@@ -3977,7 +4054,10 @@
           <a:bodyPr/>
           <a:lstStyle/>
           <a:p>
-            <a:endParaRPr lang="en-AU"/>
+            <a:r>
+              <a:rPr lang="en-AU" dirty="0"/>
+              <a:t>No animation, so will use default timing</a:t>
+            </a:r>
           </a:p>
         </p:txBody>
       </p:sp>
@@ -4032,7 +4112,10 @@
           <a:bodyPr/>
           <a:lstStyle/>
           <a:p>
-            <a:endParaRPr lang="en-AU"/>
+            <a:r>
+              <a:rPr lang="en-AU" dirty="0"/>
+              <a:t>Slide 2</a:t>
+            </a:r>
           </a:p>
         </p:txBody>
       </p:sp>
@@ -4057,14 +4140,582 @@
           <a:bodyPr/>
           <a:lstStyle/>
           <a:p>
-            <a:endParaRPr lang="en-AU"/>
+            <a:r>
+              <a:rPr lang="en-AU" dirty="0"/>
+              <a:t>Total Animation Time (9s)</a:t>
+            </a:r>
+          </a:p>
+        </p:txBody>
+      </p:sp>
+      <p:sp>
+        <p:nvSpPr>
+          <p:cNvPr id="4" name="Rectangle: Top Corners Rounded 3">
+            <a:extLst>
+              <a:ext uri="{FF2B5EF4-FFF2-40B4-BE49-F238E27FC236}">
+                <a16:creationId xmlns:a16="http://schemas.microsoft.com/office/drawing/2014/main" id="{C629EA58-1756-7463-30BE-623BFC1B1F30}"/>
+              </a:ext>
+            </a:extLst>
+          </p:cNvPr>
+          <p:cNvSpPr/>
+          <p:nvPr/>
+        </p:nvSpPr>
+        <p:spPr>
+          <a:xfrm>
+            <a:off x="875211" y="619443"/>
+            <a:ext cx="1685109" cy="1005840"/>
+          </a:xfrm>
+          <a:prstGeom prst="round2SameRect">
+            <a:avLst/>
+          </a:prstGeom>
+        </p:spPr>
+        <p:style>
+          <a:lnRef idx="2">
+            <a:schemeClr val="accent1">
+              <a:shade val="15000"/>
+            </a:schemeClr>
+          </a:lnRef>
+          <a:fillRef idx="1">
+            <a:schemeClr val="accent1"/>
+          </a:fillRef>
+          <a:effectRef idx="0">
+            <a:schemeClr val="accent1"/>
+          </a:effectRef>
+          <a:fontRef idx="minor">
+            <a:schemeClr val="lt1"/>
+          </a:fontRef>
+        </p:style>
+        <p:txBody>
+          <a:bodyPr rtlCol="0" anchor="ctr"/>
+          <a:lstStyle/>
+          <a:p>
+            <a:pPr algn="ctr"/>
+            <a:r>
+              <a:rPr lang="en-AU" dirty="0"/>
+              <a:t>Takes 1s</a:t>
+            </a:r>
+          </a:p>
+        </p:txBody>
+      </p:sp>
+      <p:sp>
+        <p:nvSpPr>
+          <p:cNvPr id="5" name="Rectangle: Top Corners Rounded 4">
+            <a:extLst>
+              <a:ext uri="{FF2B5EF4-FFF2-40B4-BE49-F238E27FC236}">
+                <a16:creationId xmlns:a16="http://schemas.microsoft.com/office/drawing/2014/main" id="{2A6861A7-8B99-EE82-DD37-83E9870A33AC}"/>
+              </a:ext>
+            </a:extLst>
+          </p:cNvPr>
+          <p:cNvSpPr/>
+          <p:nvPr/>
+        </p:nvSpPr>
+        <p:spPr>
+          <a:xfrm>
+            <a:off x="5253445" y="619443"/>
+            <a:ext cx="1685109" cy="1005840"/>
+          </a:xfrm>
+          <a:prstGeom prst="round2SameRect">
+            <a:avLst/>
+          </a:prstGeom>
+        </p:spPr>
+        <p:style>
+          <a:lnRef idx="2">
+            <a:schemeClr val="accent1">
+              <a:shade val="15000"/>
+            </a:schemeClr>
+          </a:lnRef>
+          <a:fillRef idx="1">
+            <a:schemeClr val="accent1"/>
+          </a:fillRef>
+          <a:effectRef idx="0">
+            <a:schemeClr val="accent1"/>
+          </a:effectRef>
+          <a:fontRef idx="minor">
+            <a:schemeClr val="lt1"/>
+          </a:fontRef>
+        </p:style>
+        <p:txBody>
+          <a:bodyPr rtlCol="0" anchor="ctr"/>
+          <a:lstStyle/>
+          <a:p>
+            <a:pPr algn="ctr"/>
+            <a:r>
+              <a:rPr lang="en-AU" dirty="0"/>
+              <a:t>Takes 7s</a:t>
+            </a:r>
+          </a:p>
+        </p:txBody>
+      </p:sp>
+      <p:sp>
+        <p:nvSpPr>
+          <p:cNvPr id="6" name="Rectangle: Top Corners Rounded 5">
+            <a:extLst>
+              <a:ext uri="{FF2B5EF4-FFF2-40B4-BE49-F238E27FC236}">
+                <a16:creationId xmlns:a16="http://schemas.microsoft.com/office/drawing/2014/main" id="{108C8BE1-863D-221A-39B6-8821801FAB92}"/>
+              </a:ext>
+            </a:extLst>
+          </p:cNvPr>
+          <p:cNvSpPr/>
+          <p:nvPr/>
+        </p:nvSpPr>
+        <p:spPr>
+          <a:xfrm>
+            <a:off x="9631679" y="619443"/>
+            <a:ext cx="1685109" cy="1005840"/>
+          </a:xfrm>
+          <a:prstGeom prst="round2SameRect">
+            <a:avLst/>
+          </a:prstGeom>
+        </p:spPr>
+        <p:style>
+          <a:lnRef idx="2">
+            <a:schemeClr val="accent1">
+              <a:shade val="15000"/>
+            </a:schemeClr>
+          </a:lnRef>
+          <a:fillRef idx="1">
+            <a:schemeClr val="accent1"/>
+          </a:fillRef>
+          <a:effectRef idx="0">
+            <a:schemeClr val="accent1"/>
+          </a:effectRef>
+          <a:fontRef idx="minor">
+            <a:schemeClr val="lt1"/>
+          </a:fontRef>
+        </p:style>
+        <p:txBody>
+          <a:bodyPr rtlCol="0" anchor="ctr"/>
+          <a:lstStyle/>
+          <a:p>
+            <a:pPr algn="ctr"/>
+            <a:r>
+              <a:rPr lang="en-AU" dirty="0"/>
+              <a:t>Takes 1s</a:t>
+            </a:r>
           </a:p>
         </p:txBody>
       </p:sp>
     </p:spTree>
     <p:extLst>
       <p:ext uri="{BB962C8B-B14F-4D97-AF65-F5344CB8AC3E}">
-        <p14:creationId xmlns:p14="http://schemas.microsoft.com/office/powerpoint/2010/main" val="2551455340"/>
+        <p14:creationId xmlns:p14="http://schemas.microsoft.com/office/powerpoint/2010/main" val="1667816988"/>
+      </p:ext>
+    </p:extLst>
+  </p:cSld>
+  <p:clrMapOvr>
+    <a:masterClrMapping/>
+  </p:clrMapOvr>
+  <p:timing>
+    <p:tnLst>
+      <p:par>
+        <p:cTn id="1" dur="indefinite" restart="never" nodeType="tmRoot">
+          <p:childTnLst>
+            <p:seq concurrent="1" nextAc="seek">
+              <p:cTn id="2" dur="indefinite" nodeType="mainSeq">
+                <p:childTnLst>
+                  <p:par>
+                    <p:cTn id="3" fill="hold">
+                      <p:stCondLst>
+                        <p:cond delay="indefinite"/>
+                      </p:stCondLst>
+                      <p:childTnLst>
+                        <p:par>
+                          <p:cTn id="4" fill="hold">
+                            <p:stCondLst>
+                              <p:cond delay="0"/>
+                            </p:stCondLst>
+                            <p:childTnLst>
+                              <p:par>
+                                <p:cTn id="5" presetID="42" presetClass="entr" presetSubtype="0" fill="hold" grpId="0" nodeType="clickEffect">
+                                  <p:stCondLst>
+                                    <p:cond delay="0"/>
+                                  </p:stCondLst>
+                                  <p:childTnLst>
+                                    <p:set>
+                                      <p:cBhvr>
+                                        <p:cTn id="6" dur="1" fill="hold">
+                                          <p:stCondLst>
+                                            <p:cond delay="0"/>
+                                          </p:stCondLst>
+                                        </p:cTn>
+                                        <p:tgtEl>
+                                          <p:spTgt spid="4"/>
+                                        </p:tgtEl>
+                                        <p:attrNameLst>
+                                          <p:attrName>style.visibility</p:attrName>
+                                        </p:attrNameLst>
+                                      </p:cBhvr>
+                                      <p:to>
+                                        <p:strVal val="visible"/>
+                                      </p:to>
+                                    </p:set>
+                                    <p:animEffect transition="in" filter="fade">
+                                      <p:cBhvr>
+                                        <p:cTn id="7" dur="1000"/>
+                                        <p:tgtEl>
+                                          <p:spTgt spid="4"/>
+                                        </p:tgtEl>
+                                      </p:cBhvr>
+                                    </p:animEffect>
+                                    <p:anim calcmode="lin" valueType="num">
+                                      <p:cBhvr>
+                                        <p:cTn id="8" dur="1000" fill="hold"/>
+                                        <p:tgtEl>
+                                          <p:spTgt spid="4"/>
+                                        </p:tgtEl>
+                                        <p:attrNameLst>
+                                          <p:attrName>ppt_x</p:attrName>
+                                        </p:attrNameLst>
+                                      </p:cBhvr>
+                                      <p:tavLst>
+                                        <p:tav tm="0">
+                                          <p:val>
+                                            <p:strVal val="#ppt_x"/>
+                                          </p:val>
+                                        </p:tav>
+                                        <p:tav tm="100000">
+                                          <p:val>
+                                            <p:strVal val="#ppt_x"/>
+                                          </p:val>
+                                        </p:tav>
+                                      </p:tavLst>
+                                    </p:anim>
+                                    <p:anim calcmode="lin" valueType="num">
+                                      <p:cBhvr>
+                                        <p:cTn id="9" dur="1000" fill="hold"/>
+                                        <p:tgtEl>
+                                          <p:spTgt spid="4"/>
+                                        </p:tgtEl>
+                                        <p:attrNameLst>
+                                          <p:attrName>ppt_y</p:attrName>
+                                        </p:attrNameLst>
+                                      </p:cBhvr>
+                                      <p:tavLst>
+                                        <p:tav tm="0">
+                                          <p:val>
+                                            <p:strVal val="#ppt_y+.1"/>
+                                          </p:val>
+                                        </p:tav>
+                                        <p:tav tm="100000">
+                                          <p:val>
+                                            <p:strVal val="#ppt_y"/>
+                                          </p:val>
+                                        </p:tav>
+                                      </p:tavLst>
+                                    </p:anim>
+                                  </p:childTnLst>
+                                </p:cTn>
+                              </p:par>
+                            </p:childTnLst>
+                          </p:cTn>
+                        </p:par>
+                      </p:childTnLst>
+                    </p:cTn>
+                  </p:par>
+                  <p:par>
+                    <p:cTn id="10" fill="hold">
+                      <p:stCondLst>
+                        <p:cond delay="indefinite"/>
+                      </p:stCondLst>
+                      <p:childTnLst>
+                        <p:par>
+                          <p:cTn id="11" fill="hold">
+                            <p:stCondLst>
+                              <p:cond delay="0"/>
+                            </p:stCondLst>
+                            <p:childTnLst>
+                              <p:par>
+                                <p:cTn id="12" presetID="42" presetClass="entr" presetSubtype="0" fill="hold" grpId="0" nodeType="clickEffect">
+                                  <p:stCondLst>
+                                    <p:cond delay="0"/>
+                                  </p:stCondLst>
+                                  <p:childTnLst>
+                                    <p:set>
+                                      <p:cBhvr>
+                                        <p:cTn id="13" dur="1" fill="hold">
+                                          <p:stCondLst>
+                                            <p:cond delay="0"/>
+                                          </p:stCondLst>
+                                        </p:cTn>
+                                        <p:tgtEl>
+                                          <p:spTgt spid="5"/>
+                                        </p:tgtEl>
+                                        <p:attrNameLst>
+                                          <p:attrName>style.visibility</p:attrName>
+                                        </p:attrNameLst>
+                                      </p:cBhvr>
+                                      <p:to>
+                                        <p:strVal val="visible"/>
+                                      </p:to>
+                                    </p:set>
+                                    <p:animEffect transition="in" filter="fade">
+                                      <p:cBhvr>
+                                        <p:cTn id="14" dur="7000"/>
+                                        <p:tgtEl>
+                                          <p:spTgt spid="5"/>
+                                        </p:tgtEl>
+                                      </p:cBhvr>
+                                    </p:animEffect>
+                                    <p:anim calcmode="lin" valueType="num">
+                                      <p:cBhvr>
+                                        <p:cTn id="15" dur="7000" fill="hold"/>
+                                        <p:tgtEl>
+                                          <p:spTgt spid="5"/>
+                                        </p:tgtEl>
+                                        <p:attrNameLst>
+                                          <p:attrName>ppt_x</p:attrName>
+                                        </p:attrNameLst>
+                                      </p:cBhvr>
+                                      <p:tavLst>
+                                        <p:tav tm="0">
+                                          <p:val>
+                                            <p:strVal val="#ppt_x"/>
+                                          </p:val>
+                                        </p:tav>
+                                        <p:tav tm="100000">
+                                          <p:val>
+                                            <p:strVal val="#ppt_x"/>
+                                          </p:val>
+                                        </p:tav>
+                                      </p:tavLst>
+                                    </p:anim>
+                                    <p:anim calcmode="lin" valueType="num">
+                                      <p:cBhvr>
+                                        <p:cTn id="16" dur="7000" fill="hold"/>
+                                        <p:tgtEl>
+                                          <p:spTgt spid="5"/>
+                                        </p:tgtEl>
+                                        <p:attrNameLst>
+                                          <p:attrName>ppt_y</p:attrName>
+                                        </p:attrNameLst>
+                                      </p:cBhvr>
+                                      <p:tavLst>
+                                        <p:tav tm="0">
+                                          <p:val>
+                                            <p:strVal val="#ppt_y+.1"/>
+                                          </p:val>
+                                        </p:tav>
+                                        <p:tav tm="100000">
+                                          <p:val>
+                                            <p:strVal val="#ppt_y"/>
+                                          </p:val>
+                                        </p:tav>
+                                      </p:tavLst>
+                                    </p:anim>
+                                  </p:childTnLst>
+                                </p:cTn>
+                              </p:par>
+                            </p:childTnLst>
+                          </p:cTn>
+                        </p:par>
+                      </p:childTnLst>
+                    </p:cTn>
+                  </p:par>
+                  <p:par>
+                    <p:cTn id="17" fill="hold">
+                      <p:stCondLst>
+                        <p:cond delay="indefinite"/>
+                      </p:stCondLst>
+                      <p:childTnLst>
+                        <p:par>
+                          <p:cTn id="18" fill="hold">
+                            <p:stCondLst>
+                              <p:cond delay="0"/>
+                            </p:stCondLst>
+                            <p:childTnLst>
+                              <p:par>
+                                <p:cTn id="19" presetID="42" presetClass="entr" presetSubtype="0" fill="hold" grpId="0" nodeType="clickEffect">
+                                  <p:stCondLst>
+                                    <p:cond delay="0"/>
+                                  </p:stCondLst>
+                                  <p:childTnLst>
+                                    <p:set>
+                                      <p:cBhvr>
+                                        <p:cTn id="20" dur="1" fill="hold">
+                                          <p:stCondLst>
+                                            <p:cond delay="0"/>
+                                          </p:stCondLst>
+                                        </p:cTn>
+                                        <p:tgtEl>
+                                          <p:spTgt spid="6"/>
+                                        </p:tgtEl>
+                                        <p:attrNameLst>
+                                          <p:attrName>style.visibility</p:attrName>
+                                        </p:attrNameLst>
+                                      </p:cBhvr>
+                                      <p:to>
+                                        <p:strVal val="visible"/>
+                                      </p:to>
+                                    </p:set>
+                                    <p:animEffect transition="in" filter="fade">
+                                      <p:cBhvr>
+                                        <p:cTn id="21" dur="1000"/>
+                                        <p:tgtEl>
+                                          <p:spTgt spid="6"/>
+                                        </p:tgtEl>
+                                      </p:cBhvr>
+                                    </p:animEffect>
+                                    <p:anim calcmode="lin" valueType="num">
+                                      <p:cBhvr>
+                                        <p:cTn id="22" dur="1000" fill="hold"/>
+                                        <p:tgtEl>
+                                          <p:spTgt spid="6"/>
+                                        </p:tgtEl>
+                                        <p:attrNameLst>
+                                          <p:attrName>ppt_x</p:attrName>
+                                        </p:attrNameLst>
+                                      </p:cBhvr>
+                                      <p:tavLst>
+                                        <p:tav tm="0">
+                                          <p:val>
+                                            <p:strVal val="#ppt_x"/>
+                                          </p:val>
+                                        </p:tav>
+                                        <p:tav tm="100000">
+                                          <p:val>
+                                            <p:strVal val="#ppt_x"/>
+                                          </p:val>
+                                        </p:tav>
+                                      </p:tavLst>
+                                    </p:anim>
+                                    <p:anim calcmode="lin" valueType="num">
+                                      <p:cBhvr>
+                                        <p:cTn id="23" dur="1000" fill="hold"/>
+                                        <p:tgtEl>
+                                          <p:spTgt spid="6"/>
+                                        </p:tgtEl>
+                                        <p:attrNameLst>
+                                          <p:attrName>ppt_y</p:attrName>
+                                        </p:attrNameLst>
+                                      </p:cBhvr>
+                                      <p:tavLst>
+                                        <p:tav tm="0">
+                                          <p:val>
+                                            <p:strVal val="#ppt_y+.1"/>
+                                          </p:val>
+                                        </p:tav>
+                                        <p:tav tm="100000">
+                                          <p:val>
+                                            <p:strVal val="#ppt_y"/>
+                                          </p:val>
+                                        </p:tav>
+                                      </p:tavLst>
+                                    </p:anim>
+                                  </p:childTnLst>
+                                </p:cTn>
+                              </p:par>
+                            </p:childTnLst>
+                          </p:cTn>
+                        </p:par>
+                      </p:childTnLst>
+                    </p:cTn>
+                  </p:par>
+                </p:childTnLst>
+              </p:cTn>
+              <p:prevCondLst>
+                <p:cond evt="onPrev" delay="0">
+                  <p:tgtEl>
+                    <p:sldTgt/>
+                  </p:tgtEl>
+                </p:cond>
+              </p:prevCondLst>
+              <p:nextCondLst>
+                <p:cond evt="onNext" delay="0">
+                  <p:tgtEl>
+                    <p:sldTgt/>
+                  </p:tgtEl>
+                </p:cond>
+              </p:nextCondLst>
+            </p:seq>
+          </p:childTnLst>
+        </p:cTn>
+      </p:par>
+    </p:tnLst>
+    <p:bldLst>
+      <p:bldP spid="4" grpId="0" animBg="1"/>
+      <p:bldP spid="5" grpId="0" animBg="1"/>
+      <p:bldP spid="6" grpId="0" animBg="1"/>
+    </p:bldLst>
+  </p:timing>
+</p:sld>
+</file>
+
+<file path=ppt/slides/slide3.xml><?xml version="1.0" encoding="utf-8"?>
+<p:sld xmlns:a="http://schemas.openxmlformats.org/drawingml/2006/main" xmlns:r="http://schemas.openxmlformats.org/officeDocument/2006/relationships" xmlns:p="http://schemas.openxmlformats.org/presentationml/2006/main">
+  <p:cSld>
+    <p:spTree>
+      <p:nvGrpSpPr>
+        <p:cNvPr id="1" name=""/>
+        <p:cNvGrpSpPr/>
+        <p:nvPr/>
+      </p:nvGrpSpPr>
+      <p:grpSpPr>
+        <a:xfrm>
+          <a:off x="0" y="0"/>
+          <a:ext cx="0" cy="0"/>
+          <a:chOff x="0" y="0"/>
+          <a:chExt cx="0" cy="0"/>
+        </a:xfrm>
+      </p:grpSpPr>
+      <p:sp>
+        <p:nvSpPr>
+          <p:cNvPr id="2" name="Title 1">
+            <a:extLst>
+              <a:ext uri="{FF2B5EF4-FFF2-40B4-BE49-F238E27FC236}">
+                <a16:creationId xmlns:a16="http://schemas.microsoft.com/office/drawing/2014/main" id="{9B697F4E-E52C-F920-B0D5-A661B1172876}"/>
+              </a:ext>
+            </a:extLst>
+          </p:cNvPr>
+          <p:cNvSpPr>
+            <a:spLocks noGrp="1"/>
+          </p:cNvSpPr>
+          <p:nvPr>
+            <p:ph type="ctrTitle"/>
+          </p:nvPr>
+        </p:nvSpPr>
+        <p:spPr/>
+        <p:txBody>
+          <a:bodyPr/>
+          <a:lstStyle/>
+          <a:p>
+            <a:r>
+              <a:rPr lang="en-AU" dirty="0"/>
+              <a:t>Slide 3</a:t>
+            </a:r>
+          </a:p>
+        </p:txBody>
+      </p:sp>
+      <p:sp>
+        <p:nvSpPr>
+          <p:cNvPr id="3" name="Subtitle 2">
+            <a:extLst>
+              <a:ext uri="{FF2B5EF4-FFF2-40B4-BE49-F238E27FC236}">
+                <a16:creationId xmlns:a16="http://schemas.microsoft.com/office/drawing/2014/main" id="{AC3BC262-9766-54F9-446B-CD68980CB1EB}"/>
+              </a:ext>
+            </a:extLst>
+          </p:cNvPr>
+          <p:cNvSpPr>
+            <a:spLocks noGrp="1"/>
+          </p:cNvSpPr>
+          <p:nvPr>
+            <p:ph type="subTitle" idx="1"/>
+          </p:nvPr>
+        </p:nvSpPr>
+        <p:spPr/>
+        <p:txBody>
+          <a:bodyPr/>
+          <a:lstStyle/>
+          <a:p>
+            <a:r>
+              <a:rPr lang="en-AU" dirty="0"/>
+              <a:t>No animation, so will use default timing</a:t>
+            </a:r>
+          </a:p>
+        </p:txBody>
+      </p:sp>
+    </p:spTree>
+    <p:extLst>
+      <p:ext uri="{BB962C8B-B14F-4D97-AF65-F5344CB8AC3E}">
+        <p14:creationId xmlns:p14="http://schemas.microsoft.com/office/powerpoint/2010/main" val="3387638093"/>
       </p:ext>
     </p:extLst>
   </p:cSld>

</xml_diff>

<commit_message>
updated based on todo list
</commit_message>
<xml_diff>
--- a/test.pptx
+++ b/test.pptx
@@ -199,7 +199,7 @@
           <a:p>
             <a:fld id="{2E1F56A2-3178-4782-B2EE-2EC55770787F}" type="datetimeFigureOut">
               <a:rPr lang="en-AU" smtClean="0"/>
-              <a:t>28/03/2024</a:t>
+              <a:t>4/03/2025</a:t>
             </a:fld>
             <a:endParaRPr lang="en-AU"/>
           </a:p>
@@ -513,20 +513,13 @@
           <a:p>
             <a:r>
               <a:rPr lang="en-AU" b="0" dirty="0"/>
-              <a:t>This is the first slide, it has this note</a:t>
-            </a:r>
-          </a:p>
-          <a:p>
-            <a:r>
-              <a:rPr lang="en-AU" b="0" dirty="0"/>
-              <a:t>{pause 2}</a:t>
-            </a:r>
-          </a:p>
-          <a:p>
-            <a:r>
-              <a:rPr lang="en-AU" b="0" dirty="0"/>
-              <a:t>This is still the first slide and has this note after a 2 second pause.</a:t>
-            </a:r>
+              <a:t>This is the first slide.  There is no pause, so the slide will </a:t>
+            </a:r>
+            <a:r>
+              <a:rPr lang="en-AU" b="0"/>
+              <a:t>complete now.</a:t>
+            </a:r>
+            <a:endParaRPr lang="en-AU" b="0" dirty="0"/>
           </a:p>
           <a:p>
             <a:endParaRPr lang="en-AU" b="1" dirty="0"/>
@@ -613,9 +606,32 @@
           <a:bodyPr/>
           <a:lstStyle/>
           <a:p>
+            <a:pPr marL="0" marR="0" lvl="0" indent="0" algn="l" defTabSz="914400" rtl="0" eaLnBrk="1" fontAlgn="auto" latinLnBrk="0" hangingPunct="1">
+              <a:lnSpc>
+                <a:spcPct val="100000"/>
+              </a:lnSpc>
+              <a:spcBef>
+                <a:spcPts val="0"/>
+              </a:spcBef>
+              <a:spcAft>
+                <a:spcPts val="0"/>
+              </a:spcAft>
+              <a:buClrTx/>
+              <a:buSzTx/>
+              <a:buFontTx/>
+              <a:buNone/>
+              <a:tabLst/>
+              <a:defRPr/>
+            </a:pPr>
             <a:r>
               <a:rPr lang="en-AU" b="0" dirty="0"/>
-              <a:t>This is the second slide, it has this note</a:t>
+              <a:t>This is the second slide with a 1 second pause here. {pause 1}</a:t>
+            </a:r>
+          </a:p>
+          <a:p>
+            <a:r>
+              <a:rPr lang="en-AU" b="0" dirty="0"/>
+              <a:t>I will now pause for 3 seconds. </a:t>
             </a:r>
           </a:p>
           <a:p>
@@ -627,8 +643,19 @@
           <a:p>
             <a:r>
               <a:rPr lang="en-AU" b="0" dirty="0"/>
-              <a:t>This is still the second slide and has this note after a 3 second pause.</a:t>
-            </a:r>
+              <a:t>This concludes the text on the second slide.</a:t>
+            </a:r>
+          </a:p>
+          <a:p>
+            <a:r>
+              <a:rPr lang="en-AU" b="0" dirty="0"/>
+              <a:t>See you in the </a:t>
+            </a:r>
+            <a:r>
+              <a:rPr lang="en-AU" b="0"/>
+              <a:t>next slide!</a:t>
+            </a:r>
+            <a:endParaRPr lang="en-AU" b="0" dirty="0"/>
           </a:p>
         </p:txBody>
       </p:sp>
@@ -714,7 +741,7 @@
           <a:p>
             <a:r>
               <a:rPr lang="en-AU" b="0" dirty="0"/>
-              <a:t>This is the third slide, it has this note</a:t>
+              <a:t>This is the third slide I will now pause for 10 seconds. </a:t>
             </a:r>
           </a:p>
           <a:p>
@@ -726,11 +753,8 @@
           <a:p>
             <a:r>
               <a:rPr lang="en-AU" b="0" dirty="0"/>
-              <a:t>This is still the third slide and has this note after a 10 second pause.</a:t>
-            </a:r>
-          </a:p>
-          <a:p>
-            <a:endParaRPr lang="en-AU" b="1" dirty="0"/>
+              <a:t>This concludes the text on the third slide.</a:t>
+            </a:r>
           </a:p>
         </p:txBody>
       </p:sp>
@@ -919,7 +943,7 @@
           <a:p>
             <a:fld id="{66FE9D8B-FE65-4D70-813C-B0C2953C31EE}" type="datetimeFigureOut">
               <a:rPr lang="en-AU" smtClean="0"/>
-              <a:t>28/03/2024</a:t>
+              <a:t>4/03/2025</a:t>
             </a:fld>
             <a:endParaRPr lang="en-AU"/>
           </a:p>
@@ -1119,7 +1143,7 @@
           <a:p>
             <a:fld id="{66FE9D8B-FE65-4D70-813C-B0C2953C31EE}" type="datetimeFigureOut">
               <a:rPr lang="en-AU" smtClean="0"/>
-              <a:t>28/03/2024</a:t>
+              <a:t>4/03/2025</a:t>
             </a:fld>
             <a:endParaRPr lang="en-AU"/>
           </a:p>
@@ -1329,7 +1353,7 @@
           <a:p>
             <a:fld id="{66FE9D8B-FE65-4D70-813C-B0C2953C31EE}" type="datetimeFigureOut">
               <a:rPr lang="en-AU" smtClean="0"/>
-              <a:t>28/03/2024</a:t>
+              <a:t>4/03/2025</a:t>
             </a:fld>
             <a:endParaRPr lang="en-AU"/>
           </a:p>
@@ -1529,7 +1553,7 @@
           <a:p>
             <a:fld id="{66FE9D8B-FE65-4D70-813C-B0C2953C31EE}" type="datetimeFigureOut">
               <a:rPr lang="en-AU" smtClean="0"/>
-              <a:t>28/03/2024</a:t>
+              <a:t>4/03/2025</a:t>
             </a:fld>
             <a:endParaRPr lang="en-AU"/>
           </a:p>
@@ -1805,7 +1829,7 @@
           <a:p>
             <a:fld id="{66FE9D8B-FE65-4D70-813C-B0C2953C31EE}" type="datetimeFigureOut">
               <a:rPr lang="en-AU" smtClean="0"/>
-              <a:t>28/03/2024</a:t>
+              <a:t>4/03/2025</a:t>
             </a:fld>
             <a:endParaRPr lang="en-AU"/>
           </a:p>
@@ -2073,7 +2097,7 @@
           <a:p>
             <a:fld id="{66FE9D8B-FE65-4D70-813C-B0C2953C31EE}" type="datetimeFigureOut">
               <a:rPr lang="en-AU" smtClean="0"/>
-              <a:t>28/03/2024</a:t>
+              <a:t>4/03/2025</a:t>
             </a:fld>
             <a:endParaRPr lang="en-AU"/>
           </a:p>
@@ -2488,7 +2512,7 @@
           <a:p>
             <a:fld id="{66FE9D8B-FE65-4D70-813C-B0C2953C31EE}" type="datetimeFigureOut">
               <a:rPr lang="en-AU" smtClean="0"/>
-              <a:t>28/03/2024</a:t>
+              <a:t>4/03/2025</a:t>
             </a:fld>
             <a:endParaRPr lang="en-AU"/>
           </a:p>
@@ -2630,7 +2654,7 @@
           <a:p>
             <a:fld id="{66FE9D8B-FE65-4D70-813C-B0C2953C31EE}" type="datetimeFigureOut">
               <a:rPr lang="en-AU" smtClean="0"/>
-              <a:t>28/03/2024</a:t>
+              <a:t>4/03/2025</a:t>
             </a:fld>
             <a:endParaRPr lang="en-AU"/>
           </a:p>
@@ -2743,7 +2767,7 @@
           <a:p>
             <a:fld id="{66FE9D8B-FE65-4D70-813C-B0C2953C31EE}" type="datetimeFigureOut">
               <a:rPr lang="en-AU" smtClean="0"/>
-              <a:t>28/03/2024</a:t>
+              <a:t>4/03/2025</a:t>
             </a:fld>
             <a:endParaRPr lang="en-AU"/>
           </a:p>
@@ -3056,7 +3080,7 @@
           <a:p>
             <a:fld id="{66FE9D8B-FE65-4D70-813C-B0C2953C31EE}" type="datetimeFigureOut">
               <a:rPr lang="en-AU" smtClean="0"/>
-              <a:t>28/03/2024</a:t>
+              <a:t>4/03/2025</a:t>
             </a:fld>
             <a:endParaRPr lang="en-AU"/>
           </a:p>
@@ -3345,7 +3369,7 @@
           <a:p>
             <a:fld id="{66FE9D8B-FE65-4D70-813C-B0C2953C31EE}" type="datetimeFigureOut">
               <a:rPr lang="en-AU" smtClean="0"/>
-              <a:t>28/03/2024</a:t>
+              <a:t>4/03/2025</a:t>
             </a:fld>
             <a:endParaRPr lang="en-AU"/>
           </a:p>
@@ -3588,7 +3612,7 @@
           <a:p>
             <a:fld id="{66FE9D8B-FE65-4D70-813C-B0C2953C31EE}" type="datetimeFigureOut">
               <a:rPr lang="en-AU" smtClean="0"/>
-              <a:t>28/03/2024</a:t>
+              <a:t>4/03/2025</a:t>
             </a:fld>
             <a:endParaRPr lang="en-AU"/>
           </a:p>

</xml_diff>